<commit_message>
update slide thread java
</commit_message>
<xml_diff>
--- a/2. Back-end/1. JavaCore/Bài 16. Tìm hiểu Thread trong Java/09. Thread trong Java.pptx
+++ b/2. Back-end/1. JavaCore/Bài 16. Tìm hiểu Thread trong Java/09. Thread trong Java.pptx
@@ -312,7 +312,7 @@
             <a:fld id="{1D8BD707-D9CF-40AE-B4C6-C98DA3205C09}" type="datetimeFigureOut">
               <a:rPr lang="en-US" smtClean="0"/>
               <a:pPr/>
-              <a:t>7/19/2018</a:t>
+              <a:t>09/19/2020</a:t>
             </a:fld>
             <a:endParaRPr lang="en-US"/>
           </a:p>
@@ -479,7 +479,7 @@
             <a:fld id="{1D8BD707-D9CF-40AE-B4C6-C98DA3205C09}" type="datetimeFigureOut">
               <a:rPr lang="en-US" smtClean="0"/>
               <a:pPr/>
-              <a:t>7/19/2018</a:t>
+              <a:t>09/19/2020</a:t>
             </a:fld>
             <a:endParaRPr lang="en-US"/>
           </a:p>
@@ -656,7 +656,7 @@
             <a:fld id="{1D8BD707-D9CF-40AE-B4C6-C98DA3205C09}" type="datetimeFigureOut">
               <a:rPr lang="en-US" smtClean="0"/>
               <a:pPr/>
-              <a:t>7/19/2018</a:t>
+              <a:t>09/19/2020</a:t>
             </a:fld>
             <a:endParaRPr lang="en-US"/>
           </a:p>
@@ -823,7 +823,7 @@
             <a:fld id="{1D8BD707-D9CF-40AE-B4C6-C98DA3205C09}" type="datetimeFigureOut">
               <a:rPr lang="en-US" smtClean="0"/>
               <a:pPr/>
-              <a:t>7/19/2018</a:t>
+              <a:t>09/19/2020</a:t>
             </a:fld>
             <a:endParaRPr lang="en-US"/>
           </a:p>
@@ -1066,7 +1066,7 @@
             <a:fld id="{1D8BD707-D9CF-40AE-B4C6-C98DA3205C09}" type="datetimeFigureOut">
               <a:rPr lang="en-US" smtClean="0"/>
               <a:pPr/>
-              <a:t>7/19/2018</a:t>
+              <a:t>09/19/2020</a:t>
             </a:fld>
             <a:endParaRPr lang="en-US"/>
           </a:p>
@@ -1351,7 +1351,7 @@
             <a:fld id="{1D8BD707-D9CF-40AE-B4C6-C98DA3205C09}" type="datetimeFigureOut">
               <a:rPr lang="en-US" smtClean="0"/>
               <a:pPr/>
-              <a:t>7/19/2018</a:t>
+              <a:t>09/19/2020</a:t>
             </a:fld>
             <a:endParaRPr lang="en-US"/>
           </a:p>
@@ -1770,7 +1770,7 @@
             <a:fld id="{1D8BD707-D9CF-40AE-B4C6-C98DA3205C09}" type="datetimeFigureOut">
               <a:rPr lang="en-US" smtClean="0"/>
               <a:pPr/>
-              <a:t>7/19/2018</a:t>
+              <a:t>09/19/2020</a:t>
             </a:fld>
             <a:endParaRPr lang="en-US"/>
           </a:p>
@@ -1885,7 +1885,7 @@
             <a:fld id="{1D8BD707-D9CF-40AE-B4C6-C98DA3205C09}" type="datetimeFigureOut">
               <a:rPr lang="en-US" smtClean="0"/>
               <a:pPr/>
-              <a:t>7/19/2018</a:t>
+              <a:t>09/19/2020</a:t>
             </a:fld>
             <a:endParaRPr lang="en-US"/>
           </a:p>
@@ -1977,7 +1977,7 @@
             <a:fld id="{1D8BD707-D9CF-40AE-B4C6-C98DA3205C09}" type="datetimeFigureOut">
               <a:rPr lang="en-US" smtClean="0"/>
               <a:pPr/>
-              <a:t>7/19/2018</a:t>
+              <a:t>09/19/2020</a:t>
             </a:fld>
             <a:endParaRPr lang="en-US"/>
           </a:p>
@@ -2251,7 +2251,7 @@
             <a:fld id="{1D8BD707-D9CF-40AE-B4C6-C98DA3205C09}" type="datetimeFigureOut">
               <a:rPr lang="en-US" smtClean="0"/>
               <a:pPr/>
-              <a:t>7/19/2018</a:t>
+              <a:t>09/19/2020</a:t>
             </a:fld>
             <a:endParaRPr lang="en-US"/>
           </a:p>
@@ -2501,7 +2501,7 @@
             <a:fld id="{1D8BD707-D9CF-40AE-B4C6-C98DA3205C09}" type="datetimeFigureOut">
               <a:rPr lang="en-US" smtClean="0"/>
               <a:pPr/>
-              <a:t>7/19/2018</a:t>
+              <a:t>09/19/2020</a:t>
             </a:fld>
             <a:endParaRPr lang="en-US"/>
           </a:p>
@@ -2711,7 +2711,7 @@
             <a:fld id="{1D8BD707-D9CF-40AE-B4C6-C98DA3205C09}" type="datetimeFigureOut">
               <a:rPr lang="en-US" smtClean="0"/>
               <a:pPr/>
-              <a:t>7/19/2018</a:t>
+              <a:t>09/19/2020</a:t>
             </a:fld>
             <a:endParaRPr lang="en-US"/>
           </a:p>
@@ -3193,6 +3193,13 @@
   <p:clrMapOvr>
     <a:masterClrMapping/>
   </p:clrMapOvr>
+  <p:timing>
+    <p:tnLst>
+      <p:par>
+        <p:cTn id="1" dur="indefinite" restart="never" nodeType="tmRoot"/>
+      </p:par>
+    </p:tnLst>
+  </p:timing>
 </p:sld>
 </file>
 
@@ -3963,6 +3970,13 @@
   <p:clrMapOvr>
     <a:masterClrMapping/>
   </p:clrMapOvr>
+  <p:timing>
+    <p:tnLst>
+      <p:par>
+        <p:cTn id="1" dur="indefinite" restart="never" nodeType="tmRoot"/>
+      </p:par>
+    </p:tnLst>
+  </p:timing>
 </p:sld>
 </file>
 
@@ -4071,6 +4085,13 @@
   <p:clrMapOvr>
     <a:masterClrMapping/>
   </p:clrMapOvr>
+  <p:timing>
+    <p:tnLst>
+      <p:par>
+        <p:cTn id="1" dur="indefinite" restart="never" nodeType="tmRoot"/>
+      </p:par>
+    </p:tnLst>
+  </p:timing>
 </p:sld>
 </file>
 
@@ -4740,6 +4761,13 @@
   <p:clrMapOvr>
     <a:masterClrMapping/>
   </p:clrMapOvr>
+  <p:timing>
+    <p:tnLst>
+      <p:par>
+        <p:cTn id="1" dur="indefinite" restart="never" nodeType="tmRoot"/>
+      </p:par>
+    </p:tnLst>
+  </p:timing>
 </p:sld>
 </file>
 
@@ -5091,6 +5119,13 @@
   <p:clrMapOvr>
     <a:masterClrMapping/>
   </p:clrMapOvr>
+  <p:timing>
+    <p:tnLst>
+      <p:par>
+        <p:cTn id="1" dur="indefinite" restart="never" nodeType="tmRoot"/>
+      </p:par>
+    </p:tnLst>
+  </p:timing>
 </p:sld>
 </file>
 
@@ -5530,6 +5565,13 @@
   <p:clrMapOvr>
     <a:masterClrMapping/>
   </p:clrMapOvr>
+  <p:timing>
+    <p:tnLst>
+      <p:par>
+        <p:cTn id="1" dur="indefinite" restart="never" nodeType="tmRoot"/>
+      </p:par>
+    </p:tnLst>
+  </p:timing>
 </p:sld>
 </file>
 
@@ -5702,6 +5744,13 @@
   <p:clrMapOvr>
     <a:masterClrMapping/>
   </p:clrMapOvr>
+  <p:timing>
+    <p:tnLst>
+      <p:par>
+        <p:cTn id="1" dur="indefinite" restart="never" nodeType="tmRoot"/>
+      </p:par>
+    </p:tnLst>
+  </p:timing>
 </p:sld>
 </file>
 
@@ -5823,6 +5872,13 @@
   <p:clrMapOvr>
     <a:masterClrMapping/>
   </p:clrMapOvr>
+  <p:timing>
+    <p:tnLst>
+      <p:par>
+        <p:cTn id="1" dur="indefinite" restart="never" nodeType="tmRoot"/>
+      </p:par>
+    </p:tnLst>
+  </p:timing>
 </p:sld>
 </file>
 
@@ -5921,6 +5977,13 @@
   <p:clrMapOvr>
     <a:masterClrMapping/>
   </p:clrMapOvr>
+  <p:timing>
+    <p:tnLst>
+      <p:par>
+        <p:cTn id="1" dur="indefinite" restart="never" nodeType="tmRoot"/>
+      </p:par>
+    </p:tnLst>
+  </p:timing>
 </p:sld>
 </file>
 
@@ -6108,6 +6171,13 @@
   <p:clrMapOvr>
     <a:masterClrMapping/>
   </p:clrMapOvr>
+  <p:timing>
+    <p:tnLst>
+      <p:par>
+        <p:cTn id="1" dur="indefinite" restart="never" nodeType="tmRoot"/>
+      </p:par>
+    </p:tnLst>
+  </p:timing>
 </p:sld>
 </file>
 
@@ -6366,6 +6436,13 @@
   <p:clrMapOvr>
     <a:masterClrMapping/>
   </p:clrMapOvr>
+  <p:timing>
+    <p:tnLst>
+      <p:par>
+        <p:cTn id="1" dur="indefinite" restart="never" nodeType="tmRoot"/>
+      </p:par>
+    </p:tnLst>
+  </p:timing>
 </p:sld>
 </file>
 
@@ -6636,6 +6713,13 @@
   <p:clrMapOvr>
     <a:masterClrMapping/>
   </p:clrMapOvr>
+  <p:timing>
+    <p:tnLst>
+      <p:par>
+        <p:cTn id="1" dur="indefinite" restart="never" nodeType="tmRoot"/>
+      </p:par>
+    </p:tnLst>
+  </p:timing>
 </p:sld>
 </file>
 
@@ -6781,8 +6865,26 @@
           <a:p>
             <a:r>
               <a:rPr lang="en-US" dirty="0" smtClean="0"/>
-              <a:t>Sleep()</a:t>
-            </a:r>
+              <a:t>Sleep</a:t>
+            </a:r>
+            <a:r>
+              <a:rPr lang="en-US" dirty="0" smtClean="0"/>
+              <a:t>()</a:t>
+            </a:r>
+            <a:endParaRPr lang="vi-VN" dirty="0" smtClean="0"/>
+          </a:p>
+          <a:p>
+            <a:r>
+              <a:rPr lang="vi-VN" dirty="0" smtClean="0"/>
+              <a:t>Wait()</a:t>
+            </a:r>
+          </a:p>
+          <a:p>
+            <a:r>
+              <a:rPr lang="vi-VN" smtClean="0"/>
+              <a:t>Notify()</a:t>
+            </a:r>
+            <a:endParaRPr lang="en-US" dirty="0" smtClean="0"/>
           </a:p>
           <a:p>
             <a:endParaRPr lang="en-US" dirty="0"/>
@@ -6799,6 +6901,13 @@
   <p:clrMapOvr>
     <a:masterClrMapping/>
   </p:clrMapOvr>
+  <p:timing>
+    <p:tnLst>
+      <p:par>
+        <p:cTn id="1" dur="indefinite" restart="never" nodeType="tmRoot"/>
+      </p:par>
+    </p:tnLst>
+  </p:timing>
 </p:sld>
 </file>
 
@@ -7004,6 +7113,13 @@
   <p:clrMapOvr>
     <a:masterClrMapping/>
   </p:clrMapOvr>
+  <p:timing>
+    <p:tnLst>
+      <p:par>
+        <p:cTn id="1" dur="indefinite" restart="never" nodeType="tmRoot"/>
+      </p:par>
+    </p:tnLst>
+  </p:timing>
 </p:sld>
 </file>
 
@@ -7093,6 +7209,13 @@
   <p:clrMapOvr>
     <a:masterClrMapping/>
   </p:clrMapOvr>
+  <p:timing>
+    <p:tnLst>
+      <p:par>
+        <p:cTn id="1" dur="indefinite" restart="never" nodeType="tmRoot"/>
+      </p:par>
+    </p:tnLst>
+  </p:timing>
 </p:sld>
 </file>
 
@@ -7396,6 +7519,13 @@
   <p:clrMapOvr>
     <a:masterClrMapping/>
   </p:clrMapOvr>
+  <p:timing>
+    <p:tnLst>
+      <p:par>
+        <p:cTn id="1" dur="indefinite" restart="never" nodeType="tmRoot"/>
+      </p:par>
+    </p:tnLst>
+  </p:timing>
 </p:sld>
 </file>
 
@@ -7676,6 +7806,13 @@
   <p:clrMapOvr>
     <a:masterClrMapping/>
   </p:clrMapOvr>
+  <p:timing>
+    <p:tnLst>
+      <p:par>
+        <p:cTn id="1" dur="indefinite" restart="never" nodeType="tmRoot"/>
+      </p:par>
+    </p:tnLst>
+  </p:timing>
 </p:sld>
 </file>
 
@@ -8092,6 +8229,13 @@
   <p:clrMapOvr>
     <a:masterClrMapping/>
   </p:clrMapOvr>
+  <p:timing>
+    <p:tnLst>
+      <p:par>
+        <p:cTn id="1" dur="indefinite" restart="never" nodeType="tmRoot"/>
+      </p:par>
+    </p:tnLst>
+  </p:timing>
 </p:sld>
 </file>
 
@@ -8457,6 +8601,13 @@
   <p:clrMapOvr>
     <a:masterClrMapping/>
   </p:clrMapOvr>
+  <p:timing>
+    <p:tnLst>
+      <p:par>
+        <p:cTn id="1" dur="indefinite" restart="never" nodeType="tmRoot"/>
+      </p:par>
+    </p:tnLst>
+  </p:timing>
 </p:sld>
 </file>
 
@@ -8868,13 +9019,8 @@
                     <a:p>
                       <a:r>
                         <a:rPr lang="en-US" sz="2000" dirty="0" smtClean="0"/>
-                        <a:t>OK – </a:t>
-                      </a:r>
-                      <a:r>
-                        <a:rPr lang="en-US" sz="2000" dirty="0" smtClean="0"/>
-                        <a:t>Multi-Thread</a:t>
-                      </a:r>
-                      <a:endParaRPr lang="en-US" sz="2000" dirty="0" smtClean="0"/>
+                        <a:t>OK – Multi-Thread</a:t>
+                      </a:r>
                     </a:p>
                   </a:txBody>
                   <a:tcPr/>
@@ -8886,15 +9032,7 @@
                     <a:p>
                       <a:r>
                         <a:rPr lang="en-US" sz="2000" dirty="0" smtClean="0"/>
-                        <a:t>OK – </a:t>
-                      </a:r>
-                      <a:r>
-                        <a:rPr lang="en-US" sz="2000" dirty="0" smtClean="0"/>
-                        <a:t>Multi </a:t>
-                      </a:r>
-                      <a:r>
-                        <a:rPr lang="en-US" sz="2000" dirty="0" smtClean="0"/>
-                        <a:t>Process</a:t>
+                        <a:t>OK – Multi Process</a:t>
                       </a:r>
                     </a:p>
                     <a:p>
@@ -9330,6 +9468,13 @@
   <p:clrMapOvr>
     <a:masterClrMapping/>
   </p:clrMapOvr>
+  <p:timing>
+    <p:tnLst>
+      <p:par>
+        <p:cTn id="1" dur="indefinite" restart="never" nodeType="tmRoot"/>
+      </p:par>
+    </p:tnLst>
+  </p:timing>
 </p:sld>
 </file>
 
@@ -9483,6 +9628,13 @@
   <p:clrMapOvr>
     <a:masterClrMapping/>
   </p:clrMapOvr>
+  <p:timing>
+    <p:tnLst>
+      <p:par>
+        <p:cTn id="1" dur="indefinite" restart="never" nodeType="tmRoot"/>
+      </p:par>
+    </p:tnLst>
+  </p:timing>
 </p:sld>
 </file>
 
@@ -9646,6 +9798,13 @@
   <p:clrMapOvr>
     <a:masterClrMapping/>
   </p:clrMapOvr>
+  <p:timing>
+    <p:tnLst>
+      <p:par>
+        <p:cTn id="1" dur="indefinite" restart="never" nodeType="tmRoot"/>
+      </p:par>
+    </p:tnLst>
+  </p:timing>
 </p:sld>
 </file>
 
@@ -9870,6 +10029,13 @@
   <p:clrMapOvr>
     <a:masterClrMapping/>
   </p:clrMapOvr>
+  <p:timing>
+    <p:tnLst>
+      <p:par>
+        <p:cTn id="1" dur="indefinite" restart="never" nodeType="tmRoot"/>
+      </p:par>
+    </p:tnLst>
+  </p:timing>
 </p:sld>
 </file>
 

</xml_diff>